<commit_message>
Push presentations and BIP.c that can compile
</commit_message>
<xml_diff>
--- a/2023.04.05-StatGen-Journal-Club-Presentation.pptx
+++ b/2023.04.05-StatGen-Journal-Club-Presentation.pptx
@@ -15,6 +15,8 @@
     <p:sldId id="263" r:id="rId9"/>
     <p:sldId id="264" r:id="rId10"/>
     <p:sldId id="265" r:id="rId11"/>
+    <p:sldId id="266" r:id="rId12"/>
+    <p:sldId id="267" r:id="rId13"/>
   </p:sldIdLst>
   <p:sldSz cx="9144000" cy="5143500" type="screen16x9"/>
   <p:notesSz cx="6858000" cy="9144000"/>
@@ -3228,492 +3230,7 @@
             </a:pPr>
             <a:r>
               <a:rPr/>
-              <a:t>Acknowledgements</a:t>
-            </a:r>
-          </a:p>
-        </p:txBody>
-      </p:sp>
-      <p:sp>
-        <p:nvSpPr>
-          <p:cNvPr id="3" name="Content Placeholder 2"/>
-          <p:cNvSpPr>
-            <a:spLocks noGrp="1"/>
-          </p:cNvSpPr>
-          <p:nvPr>
-            <p:ph idx="1"/>
-          </p:nvPr>
-        </p:nvSpPr>
-        <p:spPr/>
-        <p:txBody>
-          <a:bodyPr/>
-          <a:lstStyle/>
-          <a:p>
-            <a:pPr lvl="0"/>
-            <a:r>
-              <a:rPr/>
-              <a:t>Mark Fiecas, Thierry Chekouo, and Sandra Safo for their mentorship and expertise.</a:t>
-            </a:r>
-          </a:p>
-          <a:p>
-            <a:pPr lvl="0"/>
-            <a:r>
-              <a:rPr/>
-              <a:t>Interdisciplinary Biostatistics Training in Genetics and Genomics program, which is funded by NIH T32 Training Grant: T32 GM132063, 2020–2025</a:t>
-            </a:r>
-          </a:p>
-        </p:txBody>
-      </p:sp>
-    </p:spTree>
-  </p:cSld>
-</p:sld>
-</file>
-
-<file path=ppt/slides/slide2.xml><?xml version="1.0" encoding="utf-8"?>
-<p:sld xmlns:a="http://schemas.openxmlformats.org/drawingml/2006/main" xmlns:r="http://schemas.openxmlformats.org/officeDocument/2006/relationships" xmlns:p="http://schemas.openxmlformats.org/presentationml/2006/main">
-  <p:cSld>
-    <p:spTree>
-      <p:nvGrpSpPr>
-        <p:cNvPr id="1" name=""/>
-        <p:cNvGrpSpPr/>
-        <p:nvPr/>
-      </p:nvGrpSpPr>
-      <p:grpSpPr>
-        <a:xfrm>
-          <a:off x="0" y="0"/>
-          <a:ext cx="0" cy="0"/>
-          <a:chOff x="0" y="0"/>
-          <a:chExt cx="0" cy="0"/>
-        </a:xfrm>
-      </p:grpSpPr>
-      <p:sp>
-        <p:nvSpPr>
-          <p:cNvPr id="2" name="Title 1"/>
-          <p:cNvSpPr>
-            <a:spLocks noGrp="1"/>
-          </p:cNvSpPr>
-          <p:nvPr>
-            <p:ph type="title"/>
-          </p:nvPr>
-        </p:nvSpPr>
-        <p:spPr/>
-        <p:txBody>
-          <a:bodyPr/>
-          <a:lstStyle/>
-          <a:p>
-            <a:pPr lvl="0" indent="0" marL="0">
-              <a:buNone/>
-            </a:pPr>
-            <a:r>
-              <a:rPr/>
-              <a:t>Intro: Bayesian Integrative Analysis and Prediction with Application to Atherosclerosis Cardiovascular Disease (Chekouo and Safo 2020)</a:t>
-            </a:r>
-          </a:p>
-        </p:txBody>
-      </p:sp>
-      <p:sp>
-        <p:nvSpPr>
-          <p:cNvPr id="3" name="Content Placeholder 2"/>
-          <p:cNvSpPr>
-            <a:spLocks noGrp="1"/>
-          </p:cNvSpPr>
-          <p:nvPr>
-            <p:ph idx="1"/>
-          </p:nvPr>
-        </p:nvSpPr>
-        <p:spPr/>
-        <p:txBody>
-          <a:bodyPr/>
-          <a:lstStyle/>
-          <a:p>
-            <a:pPr lvl="0"/>
-            <a:r>
-              <a:rPr/>
-              <a:t>Authors integrate clinical, demographic, and multi-omics data to ID genetic factors involved in artherosclerosis cardiovascular disease (ASCVD).</a:t>
-            </a:r>
-          </a:p>
-          <a:p>
-            <a:pPr lvl="0"/>
-            <a:r>
-              <a:rPr/>
-              <a:t>Frequentist joint integrative analysis and prediction methods exist e.g. Safo et al. 2019 combine CCA and linear discriminant analysis, “encourag[ing] predictors that are connected and behave similarly to be selected or neglected together”.</a:t>
-            </a:r>
-          </a:p>
-          <a:p>
-            <a:pPr lvl="0"/>
-            <a:r>
-              <a:rPr/>
-              <a:t>Authors leverage </a:t>
-            </a:r>
-            <a:r>
-              <a:rPr i="1"/>
-              <a:t>Bayesian</a:t>
-            </a:r>
-            <a:r>
-              <a:rPr/>
-              <a:t> hierarchical factor analysis models for </a:t>
-            </a:r>
-            <a:r>
-              <a:rPr i="1"/>
-              <a:t>variable selection</a:t>
-            </a:r>
-            <a:r>
-              <a:rPr/>
-              <a:t> and </a:t>
-            </a:r>
-            <a:r>
-              <a:rPr i="1"/>
-              <a:t>prediction</a:t>
-            </a:r>
-            <a:r>
-              <a:rPr/>
-              <a:t>.</a:t>
-            </a:r>
-          </a:p>
-        </p:txBody>
-      </p:sp>
-    </p:spTree>
-  </p:cSld>
-</p:sld>
-</file>
-
-<file path=ppt/slides/slide3.xml><?xml version="1.0" encoding="utf-8"?>
-<p:sld xmlns:a="http://schemas.openxmlformats.org/drawingml/2006/main" xmlns:r="http://schemas.openxmlformats.org/officeDocument/2006/relationships" xmlns:p="http://schemas.openxmlformats.org/presentationml/2006/main">
-  <p:cSld>
-    <p:spTree>
-      <p:nvGrpSpPr>
-        <p:cNvPr id="1" name=""/>
-        <p:cNvGrpSpPr/>
-        <p:nvPr/>
-      </p:nvGrpSpPr>
-      <p:grpSpPr>
-        <a:xfrm>
-          <a:off x="0" y="0"/>
-          <a:ext cx="0" cy="0"/>
-          <a:chOff x="0" y="0"/>
-          <a:chExt cx="0" cy="0"/>
-        </a:xfrm>
-      </p:grpSpPr>
-      <p:sp>
-        <p:nvSpPr>
-          <p:cNvPr id="2" name="Title 1"/>
-          <p:cNvSpPr>
-            <a:spLocks noGrp="1"/>
-          </p:cNvSpPr>
-          <p:nvPr>
-            <p:ph type="title"/>
-          </p:nvPr>
-        </p:nvSpPr>
-        <p:spPr/>
-        <p:txBody>
-          <a:bodyPr/>
-          <a:lstStyle/>
-          <a:p>
-            <a:pPr lvl="0" indent="0" marL="0">
-              <a:buNone/>
-            </a:pPr>
-            <a:r>
-              <a:rPr/>
-              <a:t>Motivation: Extension to Longitudinal Data Analysis</a:t>
-            </a:r>
-          </a:p>
-        </p:txBody>
-      </p:sp>
-      <p:sp>
-        <p:nvSpPr>
-          <p:cNvPr id="3" name="Content Placeholder 2"/>
-          <p:cNvSpPr>
-            <a:spLocks noGrp="1"/>
-          </p:cNvSpPr>
-          <p:nvPr>
-            <p:ph idx="1"/>
-          </p:nvPr>
-        </p:nvSpPr>
-        <p:spPr/>
-        <p:txBody>
-          <a:bodyPr/>
-          <a:lstStyle/>
-          <a:p>
-            <a:pPr lvl="0"/>
-            <a:r>
-              <a:rPr/>
-              <a:t>Adolescent Brain and Cognitive Development (ABCD) Study is an observational, longitudinal study of US children aged 9-10 at baseline across 21 study sites.</a:t>
-            </a:r>
-          </a:p>
-          <a:p>
-            <a:pPr lvl="0"/>
-            <a:r>
-              <a:rPr/>
-              <a:t>Neuroimaging data is collected every 2 years: baseline (T1) and year 2 (T2) neuroimaging data is available in 4th release.</a:t>
-            </a:r>
-          </a:p>
-          <a:p>
-            <a:pPr lvl="0"/>
-            <a:r>
-              <a:rPr/>
-              <a:t>Developmental trajectories have lifelong implications.</a:t>
-            </a:r>
-          </a:p>
-        </p:txBody>
-      </p:sp>
-    </p:spTree>
-  </p:cSld>
-</p:sld>
-</file>
-
-<file path=ppt/slides/slide4.xml><?xml version="1.0" encoding="utf-8"?>
-<p:sld xmlns:a="http://schemas.openxmlformats.org/drawingml/2006/main" xmlns:r="http://schemas.openxmlformats.org/officeDocument/2006/relationships" xmlns:p="http://schemas.openxmlformats.org/presentationml/2006/main">
-  <p:cSld>
-    <p:spTree>
-      <p:nvGrpSpPr>
-        <p:cNvPr id="1" name=""/>
-        <p:cNvGrpSpPr/>
-        <p:nvPr/>
-      </p:nvGrpSpPr>
-      <p:grpSpPr>
-        <a:xfrm>
-          <a:off x="0" y="0"/>
-          <a:ext cx="0" cy="0"/>
-          <a:chOff x="0" y="0"/>
-          <a:chExt cx="0" cy="0"/>
-        </a:xfrm>
-      </p:grpSpPr>
-      <p:sp>
-        <p:nvSpPr>
-          <p:cNvPr id="2" name="Title 1"/>
-          <p:cNvSpPr>
-            <a:spLocks noGrp="1"/>
-          </p:cNvSpPr>
-          <p:nvPr>
-            <p:ph type="title"/>
-          </p:nvPr>
-        </p:nvSpPr>
-        <p:spPr/>
-        <p:txBody>
-          <a:bodyPr/>
-          <a:lstStyle/>
-          <a:p>
-            <a:pPr lvl="0" indent="0" marL="0">
-              <a:buNone/>
-            </a:pPr>
-            <a:r>
-              <a:rPr/>
-              <a:t>ABCD Study: Sample Demographics</a:t>
-            </a:r>
-          </a:p>
-        </p:txBody>
-      </p:sp>
-      <p:sp>
-        <p:nvSpPr>
-          <p:cNvPr id="3" name="Content Placeholder 2"/>
-          <p:cNvSpPr>
-            <a:spLocks noGrp="1"/>
-          </p:cNvSpPr>
-          <p:nvPr>
-            <p:ph idx="1"/>
-          </p:nvPr>
-        </p:nvSpPr>
-        <p:spPr/>
-        <p:txBody>
-          <a:bodyPr/>
-          <a:lstStyle/>
-          <a:p>
-            <a:pPr lvl="0" indent="0" marL="0">
-              <a:buNone/>
-            </a:pPr>
-            <a:r>
-              <a:rPr/>
-              <a:t>We have selected subjects with neuroimaging data at T1 and T2.</a:t>
-            </a:r>
-          </a:p>
-        </p:txBody>
-      </p:sp>
-    </p:spTree>
-  </p:cSld>
-</p:sld>
-</file>
-
-<file path=ppt/slides/slide5.xml><?xml version="1.0" encoding="utf-8"?>
-<p:sld xmlns:a="http://schemas.openxmlformats.org/drawingml/2006/main" xmlns:r="http://schemas.openxmlformats.org/officeDocument/2006/relationships" xmlns:p="http://schemas.openxmlformats.org/presentationml/2006/main">
-  <p:cSld>
-    <p:spTree>
-      <p:nvGrpSpPr>
-        <p:cNvPr id="1" name=""/>
-        <p:cNvGrpSpPr/>
-        <p:nvPr/>
-      </p:nvGrpSpPr>
-      <p:grpSpPr>
-        <a:xfrm>
-          <a:off x="0" y="0"/>
-          <a:ext cx="0" cy="0"/>
-          <a:chOff x="0" y="0"/>
-          <a:chExt cx="0" cy="0"/>
-        </a:xfrm>
-      </p:grpSpPr>
-      <p:sp>
-        <p:nvSpPr>
-          <p:cNvPr id="2" name="Title 1"/>
-          <p:cNvSpPr>
-            <a:spLocks noGrp="1"/>
-          </p:cNvSpPr>
-          <p:nvPr>
-            <p:ph type="title"/>
-          </p:nvPr>
-        </p:nvSpPr>
-        <p:spPr/>
-        <p:txBody>
-          <a:bodyPr/>
-          <a:lstStyle/>
-          <a:p>
-            <a:pPr lvl="0" indent="0" marL="0">
-              <a:buNone/>
-            </a:pPr>
-            <a:r>
-              <a:rPr/>
-              <a:t>ABCD Study: Missingness</a:t>
-            </a:r>
-          </a:p>
-        </p:txBody>
-      </p:sp>
-      <p:sp>
-        <p:nvSpPr>
-          <p:cNvPr id="3" name="Content Placeholder 2"/>
-          <p:cNvSpPr>
-            <a:spLocks noGrp="1"/>
-          </p:cNvSpPr>
-          <p:nvPr>
-            <p:ph idx="1"/>
-          </p:nvPr>
-        </p:nvSpPr>
-        <p:spPr/>
-        <p:txBody>
-          <a:bodyPr/>
-          <a:lstStyle/>
-          <a:p>
-            <a:pPr lvl="0" indent="0" marL="0">
-              <a:buNone/>
-            </a:pPr>
-            <a:r>
-              <a:rPr/>
-              <a:t>We plan to impute subjects with missing covariates/ outcomes.</a:t>
-            </a:r>
-          </a:p>
-        </p:txBody>
-      </p:sp>
-    </p:spTree>
-  </p:cSld>
-</p:sld>
-</file>
-
-<file path=ppt/slides/slide6.xml><?xml version="1.0" encoding="utf-8"?>
-<p:sld xmlns:a="http://schemas.openxmlformats.org/drawingml/2006/main" xmlns:r="http://schemas.openxmlformats.org/officeDocument/2006/relationships" xmlns:p="http://schemas.openxmlformats.org/presentationml/2006/main">
-  <p:cSld>
-    <p:spTree>
-      <p:nvGrpSpPr>
-        <p:cNvPr id="1" name=""/>
-        <p:cNvGrpSpPr/>
-        <p:nvPr/>
-      </p:nvGrpSpPr>
-      <p:grpSpPr>
-        <a:xfrm>
-          <a:off x="0" y="0"/>
-          <a:ext cx="0" cy="0"/>
-          <a:chOff x="0" y="0"/>
-          <a:chExt cx="0" cy="0"/>
-        </a:xfrm>
-      </p:grpSpPr>
-      <p:sp>
-        <p:nvSpPr>
-          <p:cNvPr id="2" name="Title 1"/>
-          <p:cNvSpPr>
-            <a:spLocks noGrp="1"/>
-          </p:cNvSpPr>
-          <p:nvPr>
-            <p:ph type="title"/>
-          </p:nvPr>
-        </p:nvSpPr>
-        <p:spPr/>
-        <p:txBody>
-          <a:bodyPr/>
-          <a:lstStyle/>
-          <a:p>
-            <a:pPr lvl="0" indent="0" marL="0">
-              <a:buNone/>
-            </a:pPr>
-            <a:r>
-              <a:rPr/>
-              <a:t>ABCD Study: Clinical Outcome Trajectories</a:t>
-            </a:r>
-          </a:p>
-        </p:txBody>
-      </p:sp>
-      <p:sp>
-        <p:nvSpPr>
-          <p:cNvPr id="3" name="Content Placeholder 2"/>
-          <p:cNvSpPr>
-            <a:spLocks noGrp="1"/>
-          </p:cNvSpPr>
-          <p:nvPr>
-            <p:ph idx="1"/>
-          </p:nvPr>
-        </p:nvSpPr>
-        <p:spPr/>
-        <p:txBody>
-          <a:bodyPr/>
-          <a:lstStyle/>
-          <a:p>
-            <a:pPr lvl="0" indent="0" marL="0">
-              <a:buNone/>
-            </a:pPr>
-            <a:r>
-              <a:rPr/>
-              <a:t>We are considering inclusion of a random intercept.</a:t>
-            </a:r>
-          </a:p>
-        </p:txBody>
-      </p:sp>
-    </p:spTree>
-  </p:cSld>
-</p:sld>
-</file>
-
-<file path=ppt/slides/slide7.xml><?xml version="1.0" encoding="utf-8"?>
-<p:sld xmlns:a="http://schemas.openxmlformats.org/drawingml/2006/main" xmlns:r="http://schemas.openxmlformats.org/officeDocument/2006/relationships" xmlns:p="http://schemas.openxmlformats.org/presentationml/2006/main">
-  <p:cSld>
-    <p:spTree>
-      <p:nvGrpSpPr>
-        <p:cNvPr id="1" name=""/>
-        <p:cNvGrpSpPr/>
-        <p:nvPr/>
-      </p:nvGrpSpPr>
-      <p:grpSpPr>
-        <a:xfrm>
-          <a:off x="0" y="0"/>
-          <a:ext cx="0" cy="0"/>
-          <a:chOff x="0" y="0"/>
-          <a:chExt cx="0" cy="0"/>
-        </a:xfrm>
-      </p:grpSpPr>
-      <p:sp>
-        <p:nvSpPr>
-          <p:cNvPr id="2" name="Title 1"/>
-          <p:cNvSpPr>
-            <a:spLocks noGrp="1"/>
-          </p:cNvSpPr>
-          <p:nvPr>
-            <p:ph type="title"/>
-          </p:nvPr>
-        </p:nvSpPr>
-        <p:spPr/>
-        <p:txBody>
-          <a:bodyPr/>
-          <a:lstStyle/>
-          <a:p>
-            <a:pPr lvl="0" indent="0" marL="0">
-              <a:buNone/>
-            </a:pPr>
-            <a:r>
-              <a:rPr/>
-              <a:t>Model Formulation: Integrating Multiple Data Types</a:t>
+              <a:t>Model Formulation: Incorporating Longitudinal and Mixed Effects</a:t>
             </a:r>
           </a:p>
         </p:txBody>
@@ -3739,17 +3256,6 @@
                 <a:r>
                   <a:rPr/>
                   <a:t>Indices: </a:t>
-                </a:r>
-                <a14:m>
-                  <m:oMath xmlns:m="http://schemas.openxmlformats.org/officeDocument/2006/math">
-                    <m:r>
-                      <m:t>i</m:t>
-                    </m:r>
-                  </m:oMath>
-                </a14:m>
-                <a:r>
-                  <a:rPr/>
-                  <a:t> subject, </a:t>
                 </a:r>
                 <a14:m>
                   <m:oMath xmlns:m="http://schemas.openxmlformats.org/officeDocument/2006/math">
@@ -3787,13 +3293,24 @@
                 <a14:m>
                   <m:oMath xmlns:m="http://schemas.openxmlformats.org/officeDocument/2006/math">
                     <m:r>
+                      <m:t>i</m:t>
+                    </m:r>
+                  </m:oMath>
+                </a14:m>
+                <a:r>
+                  <a:rPr/>
+                  <a:t> subject in </a:t>
+                </a:r>
+                <a14:m>
+                  <m:oMath xmlns:m="http://schemas.openxmlformats.org/officeDocument/2006/math">
+                    <m:r>
                       <m:t>c</m:t>
                     </m:r>
                   </m:oMath>
                 </a14:m>
                 <a:r>
                   <a:rPr/>
-                  <a:t> site, </a:t>
+                  <a:t> family in </a:t>
                 </a:r>
                 <a14:m>
                   <m:oMath xmlns:m="http://schemas.openxmlformats.org/officeDocument/2006/math">
@@ -3804,7 +3321,1530 @@
                 </a14:m>
                 <a:r>
                   <a:rPr/>
-                  <a:t> family.</a:t>
+                  <a:t> site (highest level)</a:t>
+                </a:r>
+              </a:p>
+              <a:p>
+                <a:pPr lvl="0"/>
+                <a:r>
+                  <a:rPr/>
+                  <a:t>Response: </a:t>
+                </a:r>
+                <a14:m>
+                  <m:oMath xmlns:m="http://schemas.openxmlformats.org/officeDocument/2006/math">
+                    <m:sSub>
+                      <m:e>
+                        <m:r>
+                          <m:t>Y</m:t>
+                        </m:r>
+                      </m:e>
+                      <m:sub>
+                        <m:r>
+                          <m:t>i</m:t>
+                        </m:r>
+                        <m:r>
+                          <m:t>t</m:t>
+                        </m:r>
+                      </m:sub>
+                    </m:sSub>
+                    <m:r>
+                      <m:rPr>
+                        <m:sty m:val="p"/>
+                      </m:rPr>
+                      <m:t>=</m:t>
+                    </m:r>
+                    <m:sSubSup>
+                      <m:e>
+                        <m:r>
+                          <m:t>Σ</m:t>
+                        </m:r>
+                      </m:e>
+                      <m:sub>
+                        <m:r>
+                          <m:t>l</m:t>
+                        </m:r>
+                        <m:r>
+                          <m:rPr>
+                            <m:sty m:val="p"/>
+                          </m:rPr>
+                          <m:t>=</m:t>
+                        </m:r>
+                        <m:r>
+                          <m:t>1</m:t>
+                        </m:r>
+                      </m:sub>
+                      <m:sup>
+                        <m:r>
+                          <m:t>r</m:t>
+                        </m:r>
+                      </m:sup>
+                    </m:sSubSup>
+                    <m:sSub>
+                      <m:e>
+                        <m:r>
+                          <m:t>U</m:t>
+                        </m:r>
+                      </m:e>
+                      <m:sub>
+                        <m:r>
+                          <m:t>i</m:t>
+                        </m:r>
+                        <m:r>
+                          <m:t>l</m:t>
+                        </m:r>
+                        <m:r>
+                          <m:t>t</m:t>
+                        </m:r>
+                      </m:sub>
+                    </m:sSub>
+                    <m:sSub>
+                      <m:e>
+                        <m:r>
+                          <m:t>β</m:t>
+                        </m:r>
+                      </m:e>
+                      <m:sub>
+                        <m:r>
+                          <m:t>l</m:t>
+                        </m:r>
+                        <m:r>
+                          <m:t>t</m:t>
+                        </m:r>
+                      </m:sub>
+                    </m:sSub>
+                    <m:r>
+                      <m:rPr>
+                        <m:sty m:val="p"/>
+                      </m:rPr>
+                      <m:t>+</m:t>
+                    </m:r>
+                    <m:r>
+                      <m:t>α</m:t>
+                    </m:r>
+                    <m:r>
+                      <m:t>t</m:t>
+                    </m:r>
+                    <m:r>
+                      <m:rPr>
+                        <m:sty m:val="p"/>
+                      </m:rPr>
+                      <m:t>+</m:t>
+                    </m:r>
+                    <m:sSub>
+                      <m:e>
+                        <m:r>
+                          <m:t>Z</m:t>
+                        </m:r>
+                      </m:e>
+                      <m:sub>
+                        <m:r>
+                          <m:t>i</m:t>
+                        </m:r>
+                      </m:sub>
+                    </m:sSub>
+                    <m:sSub>
+                      <m:e>
+                        <m:r>
+                          <m:t>γ</m:t>
+                        </m:r>
+                      </m:e>
+                      <m:sub>
+                        <m:r>
+                          <m:t>i</m:t>
+                        </m:r>
+                      </m:sub>
+                    </m:sSub>
+                    <m:r>
+                      <m:rPr>
+                        <m:sty m:val="p"/>
+                      </m:rPr>
+                      <m:t>+</m:t>
+                    </m:r>
+                    <m:sSub>
+                      <m:e>
+                        <m:r>
+                          <m:t>β</m:t>
+                        </m:r>
+                      </m:e>
+                      <m:sub>
+                        <m:r>
+                          <m:t>0</m:t>
+                        </m:r>
+                        <m:r>
+                          <m:t>c</m:t>
+                        </m:r>
+                        <m:r>
+                          <m:t>d</m:t>
+                        </m:r>
+                      </m:sub>
+                    </m:sSub>
+                    <m:r>
+                      <m:rPr>
+                        <m:sty m:val="p"/>
+                      </m:rPr>
+                      <m:t>+</m:t>
+                    </m:r>
+                    <m:sSub>
+                      <m:e>
+                        <m:r>
+                          <m:t>R</m:t>
+                        </m:r>
+                      </m:e>
+                      <m:sub>
+                        <m:r>
+                          <m:t>i</m:t>
+                        </m:r>
+                        <m:r>
+                          <m:t>c</m:t>
+                        </m:r>
+                        <m:r>
+                          <m:t>d</m:t>
+                        </m:r>
+                      </m:sub>
+                    </m:sSub>
+                    <m:r>
+                      <m:rPr>
+                        <m:sty m:val="p"/>
+                      </m:rPr>
+                      <m:t>+</m:t>
+                    </m:r>
+                    <m:sSub>
+                      <m:e>
+                        <m:r>
+                          <m:t>ϵ</m:t>
+                        </m:r>
+                      </m:e>
+                      <m:sub>
+                        <m:r>
+                          <m:t>i</m:t>
+                        </m:r>
+                        <m:r>
+                          <m:t>t</m:t>
+                        </m:r>
+                      </m:sub>
+                    </m:sSub>
+                  </m:oMath>
+                </a14:m>
+                <a:r>
+                  <a:rPr/>
+                  <a:t> where </a:t>
+                </a:r>
+                <a14:m>
+                  <m:oMath xmlns:m="http://schemas.openxmlformats.org/officeDocument/2006/math">
+                    <m:r>
+                      <m:t>α</m:t>
+                    </m:r>
+                  </m:oMath>
+                </a14:m>
+                <a:r>
+                  <a:rPr/>
+                  <a:t> fixed temporal effect, </a:t>
+                </a:r>
+                <a14:m>
+                  <m:oMath xmlns:m="http://schemas.openxmlformats.org/officeDocument/2006/math">
+                    <m:r>
+                      <m:t>Z</m:t>
+                    </m:r>
+                    <m:r>
+                      <m:t>γ</m:t>
+                    </m:r>
+                  </m:oMath>
+                </a14:m>
+                <a:r>
+                  <a:rPr/>
+                  <a:t> covariates, </a:t>
+                </a:r>
+                <a14:m>
+                  <m:oMath xmlns:m="http://schemas.openxmlformats.org/officeDocument/2006/math">
+                    <m:sSub>
+                      <m:e>
+                        <m:r>
+                          <m:t>ϵ</m:t>
+                        </m:r>
+                      </m:e>
+                      <m:sub>
+                        <m:r>
+                          <m:t>i</m:t>
+                        </m:r>
+                        <m:r>
+                          <m:t>t</m:t>
+                        </m:r>
+                      </m:sub>
+                    </m:sSub>
+                    <m:limUpp>
+                      <m:e>
+                        <m:r>
+                          <m:rPr>
+                            <m:sty m:val="p"/>
+                          </m:rPr>
+                          <m:t>∼</m:t>
+                        </m:r>
+                      </m:e>
+                      <m:lim>
+                        <m:r>
+                          <m:rPr>
+                            <m:sty m:val="p"/>
+                          </m:rPr>
+                          <m:t>i</m:t>
+                        </m:r>
+                        <m:r>
+                          <m:rPr>
+                            <m:sty m:val="p"/>
+                          </m:rPr>
+                          <m:t>i</m:t>
+                        </m:r>
+                        <m:r>
+                          <m:rPr>
+                            <m:sty m:val="p"/>
+                          </m:rPr>
+                          <m:t>d</m:t>
+                        </m:r>
+                      </m:lim>
+                    </m:limUpp>
+                    <m:r>
+                      <m:t>N</m:t>
+                    </m:r>
+                    <m:d>
+                      <m:dPr>
+                        <m:begChr m:val="("/>
+                        <m:endChr m:val=")"/>
+                        <m:sepChr m:val=""/>
+                        <m:grow/>
+                      </m:dPr>
+                      <m:e>
+                        <m:r>
+                          <m:t>0</m:t>
+                        </m:r>
+                        <m:r>
+                          <m:rPr>
+                            <m:sty m:val="p"/>
+                          </m:rPr>
+                          <m:t>,</m:t>
+                        </m:r>
+                        <m:sSubSup>
+                          <m:e>
+                            <m:r>
+                              <m:t>σ</m:t>
+                            </m:r>
+                          </m:e>
+                          <m:sub>
+                            <m:r>
+                              <m:t>i</m:t>
+                            </m:r>
+                            <m:r>
+                              <m:t>t</m:t>
+                            </m:r>
+                          </m:sub>
+                          <m:sup>
+                            <m:r>
+                              <m:t>2</m:t>
+                            </m:r>
+                          </m:sup>
+                        </m:sSubSup>
+                      </m:e>
+                    </m:d>
+                  </m:oMath>
+                </a14:m>
+              </a:p>
+              <a:p>
+                <a:pPr lvl="0"/>
+                <a:r>
+                  <a:rPr/>
+                  <a:t>Level 2 Intercept: </a:t>
+                </a:r>
+                <a14:m>
+                  <m:oMath xmlns:m="http://schemas.openxmlformats.org/officeDocument/2006/math">
+                    <m:sSub>
+                      <m:e>
+                        <m:r>
+                          <m:t>β</m:t>
+                        </m:r>
+                      </m:e>
+                      <m:sub>
+                        <m:r>
+                          <m:t>0</m:t>
+                        </m:r>
+                        <m:r>
+                          <m:t>c</m:t>
+                        </m:r>
+                        <m:r>
+                          <m:t>d</m:t>
+                        </m:r>
+                      </m:sub>
+                    </m:sSub>
+                    <m:r>
+                      <m:rPr>
+                        <m:sty m:val="p"/>
+                      </m:rPr>
+                      <m:t>=</m:t>
+                    </m:r>
+                    <m:sSub>
+                      <m:e>
+                        <m:r>
+                          <m:t>δ</m:t>
+                        </m:r>
+                      </m:e>
+                      <m:sub>
+                        <m:r>
+                          <m:t>00</m:t>
+                        </m:r>
+                        <m:r>
+                          <m:t>c</m:t>
+                        </m:r>
+                      </m:sub>
+                    </m:sSub>
+                    <m:r>
+                      <m:rPr>
+                        <m:sty m:val="p"/>
+                      </m:rPr>
+                      <m:t>+</m:t>
+                    </m:r>
+                    <m:sSub>
+                      <m:e>
+                        <m:r>
+                          <m:t>L</m:t>
+                        </m:r>
+                      </m:e>
+                      <m:sub>
+                        <m:r>
+                          <m:t>0</m:t>
+                        </m:r>
+                        <m:r>
+                          <m:t>c</m:t>
+                        </m:r>
+                        <m:r>
+                          <m:t>d</m:t>
+                        </m:r>
+                      </m:sub>
+                    </m:sSub>
+                  </m:oMath>
+                </a14:m>
+              </a:p>
+              <a:p>
+                <a:pPr lvl="0"/>
+                <a:r>
+                  <a:rPr/>
+                  <a:t>Level 3 Intercept: </a:t>
+                </a:r>
+                <a14:m>
+                  <m:oMath xmlns:m="http://schemas.openxmlformats.org/officeDocument/2006/math">
+                    <m:sSub>
+                      <m:e>
+                        <m:r>
+                          <m:t>δ</m:t>
+                        </m:r>
+                      </m:e>
+                      <m:sub>
+                        <m:r>
+                          <m:t>00</m:t>
+                        </m:r>
+                        <m:r>
+                          <m:t>d</m:t>
+                        </m:r>
+                      </m:sub>
+                    </m:sSub>
+                    <m:r>
+                      <m:rPr>
+                        <m:sty m:val="p"/>
+                      </m:rPr>
+                      <m:t>=</m:t>
+                    </m:r>
+                    <m:sSub>
+                      <m:e>
+                        <m:r>
+                          <m:t>λ</m:t>
+                        </m:r>
+                      </m:e>
+                      <m:sub>
+                        <m:r>
+                          <m:t>000</m:t>
+                        </m:r>
+                      </m:sub>
+                    </m:sSub>
+                    <m:r>
+                      <m:rPr>
+                        <m:sty m:val="p"/>
+                      </m:rPr>
+                      <m:t>+</m:t>
+                    </m:r>
+                    <m:sSub>
+                      <m:e>
+                        <m:r>
+                          <m:t>G</m:t>
+                        </m:r>
+                      </m:e>
+                      <m:sub>
+                        <m:r>
+                          <m:t>00</m:t>
+                        </m:r>
+                        <m:r>
+                          <m:t>d</m:t>
+                        </m:r>
+                      </m:sub>
+                    </m:sSub>
+                  </m:oMath>
+                </a14:m>
+              </a:p>
+              <a:p>
+                <a:pPr lvl="0"/>
+                <a14:m>
+                  <m:oMath xmlns:m="http://schemas.openxmlformats.org/officeDocument/2006/math">
+                    <m:r>
+                      <m:t>R</m:t>
+                    </m:r>
+                    <m:r>
+                      <m:rPr>
+                        <m:sty m:val="p"/>
+                      </m:rPr>
+                      <m:t>∼</m:t>
+                    </m:r>
+                    <m:r>
+                      <m:t>N</m:t>
+                    </m:r>
+                    <m:d>
+                      <m:dPr>
+                        <m:begChr m:val="("/>
+                        <m:endChr m:val=")"/>
+                        <m:sepChr m:val=""/>
+                        <m:grow/>
+                      </m:dPr>
+                      <m:e>
+                        <m:r>
+                          <m:t>0</m:t>
+                        </m:r>
+                        <m:r>
+                          <m:rPr>
+                            <m:sty m:val="p"/>
+                          </m:rPr>
+                          <m:t>,</m:t>
+                        </m:r>
+                        <m:sSup>
+                          <m:e>
+                            <m:r>
+                              <m:t>σ</m:t>
+                            </m:r>
+                          </m:e>
+                          <m:sup>
+                            <m:r>
+                              <m:t>2</m:t>
+                            </m:r>
+                          </m:sup>
+                        </m:sSup>
+                      </m:e>
+                    </m:d>
+                  </m:oMath>
+                </a14:m>
+                <a:r>
+                  <a:rPr/>
+                  <a:t>, </a:t>
+                </a:r>
+                <a14:m>
+                  <m:oMath xmlns:m="http://schemas.openxmlformats.org/officeDocument/2006/math">
+                    <m:r>
+                      <m:t>L</m:t>
+                    </m:r>
+                    <m:r>
+                      <m:rPr>
+                        <m:sty m:val="p"/>
+                      </m:rPr>
+                      <m:t>∼</m:t>
+                    </m:r>
+                    <m:r>
+                      <m:t>N</m:t>
+                    </m:r>
+                    <m:d>
+                      <m:dPr>
+                        <m:begChr m:val="("/>
+                        <m:endChr m:val=")"/>
+                        <m:sepChr m:val=""/>
+                        <m:grow/>
+                      </m:dPr>
+                      <m:e>
+                        <m:r>
+                          <m:t>0</m:t>
+                        </m:r>
+                        <m:r>
+                          <m:rPr>
+                            <m:sty m:val="p"/>
+                          </m:rPr>
+                          <m:t>,</m:t>
+                        </m:r>
+                        <m:sSup>
+                          <m:e>
+                            <m:r>
+                              <m:t>τ</m:t>
+                            </m:r>
+                          </m:e>
+                          <m:sup>
+                            <m:r>
+                              <m:t>2</m:t>
+                            </m:r>
+                          </m:sup>
+                        </m:sSup>
+                      </m:e>
+                    </m:d>
+                  </m:oMath>
+                </a14:m>
+                <a:r>
+                  <a:rPr/>
+                  <a:t>, </a:t>
+                </a:r>
+                <a14:m>
+                  <m:oMath xmlns:m="http://schemas.openxmlformats.org/officeDocument/2006/math">
+                    <m:r>
+                      <m:t>G</m:t>
+                    </m:r>
+                    <m:r>
+                      <m:rPr>
+                        <m:sty m:val="p"/>
+                      </m:rPr>
+                      <m:t>∼</m:t>
+                    </m:r>
+                    <m:r>
+                      <m:t>N</m:t>
+                    </m:r>
+                    <m:d>
+                      <m:dPr>
+                        <m:begChr m:val="("/>
+                        <m:endChr m:val=")"/>
+                        <m:sepChr m:val=""/>
+                        <m:grow/>
+                      </m:dPr>
+                      <m:e>
+                        <m:r>
+                          <m:t>0</m:t>
+                        </m:r>
+                        <m:r>
+                          <m:rPr>
+                            <m:sty m:val="p"/>
+                          </m:rPr>
+                          <m:t>,</m:t>
+                        </m:r>
+                        <m:sSup>
+                          <m:e>
+                            <m:r>
+                              <m:t>ν</m:t>
+                            </m:r>
+                          </m:e>
+                          <m:sup>
+                            <m:r>
+                              <m:t>2</m:t>
+                            </m:r>
+                          </m:sup>
+                        </m:sSup>
+                      </m:e>
+                    </m:d>
+                  </m:oMath>
+                </a14:m>
+              </a:p>
+            </p:txBody>
+          </p:sp>
+        </mc:Choice>
+      </mc:AlternateContent>
+    </p:spTree>
+  </p:cSld>
+</p:sld>
+</file>
+
+<file path=ppt/slides/slide11.xml><?xml version="1.0" encoding="utf-8"?>
+<p:sld xmlns:a="http://schemas.openxmlformats.org/drawingml/2006/main" xmlns:r="http://schemas.openxmlformats.org/officeDocument/2006/relationships" xmlns:p="http://schemas.openxmlformats.org/presentationml/2006/main">
+  <p:cSld>
+    <p:spTree>
+      <p:nvGrpSpPr>
+        <p:cNvPr id="1" name=""/>
+        <p:cNvGrpSpPr/>
+        <p:nvPr/>
+      </p:nvGrpSpPr>
+      <p:grpSpPr>
+        <a:xfrm>
+          <a:off x="0" y="0"/>
+          <a:ext cx="0" cy="0"/>
+          <a:chOff x="0" y="0"/>
+          <a:chExt cx="0" cy="0"/>
+        </a:xfrm>
+      </p:grpSpPr>
+      <p:sp>
+        <p:nvSpPr>
+          <p:cNvPr id="2" name="Title 1"/>
+          <p:cNvSpPr>
+            <a:spLocks noGrp="1"/>
+          </p:cNvSpPr>
+          <p:nvPr>
+            <p:ph type="title"/>
+          </p:nvPr>
+        </p:nvSpPr>
+        <p:spPr/>
+        <p:txBody>
+          <a:bodyPr/>
+          <a:lstStyle/>
+          <a:p>
+            <a:pPr lvl="0" indent="0" marL="0">
+              <a:buNone/>
+            </a:pPr>
+            <a:r>
+              <a:rPr/>
+              <a:t>Ponderings/ Next Steps</a:t>
+            </a:r>
+          </a:p>
+        </p:txBody>
+      </p:sp>
+      <p:sp>
+        <p:nvSpPr>
+          <p:cNvPr id="3" name="Content Placeholder 2"/>
+          <p:cNvSpPr>
+            <a:spLocks noGrp="1"/>
+          </p:cNvSpPr>
+          <p:nvPr>
+            <p:ph idx="1"/>
+          </p:nvPr>
+        </p:nvSpPr>
+        <p:spPr/>
+        <p:txBody>
+          <a:bodyPr/>
+          <a:lstStyle/>
+          <a:p>
+            <a:pPr lvl="0"/>
+            <a:r>
+              <a:rPr/>
+              <a:t>How many time points is required for longitudinal data analysis? Is two time points enough?</a:t>
+            </a:r>
+          </a:p>
+          <a:p>
+            <a:pPr lvl="1"/>
+            <a:r>
+              <a:rPr/>
+              <a:t>Potentially use a different data set?</a:t>
+            </a:r>
+          </a:p>
+          <a:p>
+            <a:pPr lvl="0"/>
+            <a:r>
+              <a:rPr/>
+              <a:t>Are we asking a biomedically relevant question? Is the priority more so about understanding adolescent brain changes specifically? Is the inclusion of a clinical outcome ahead of ourselves?</a:t>
+            </a:r>
+          </a:p>
+          <a:p>
+            <a:pPr lvl="0"/>
+            <a:r>
+              <a:rPr/>
+              <a:t>Implement cross-sectional model in R</a:t>
+            </a:r>
+          </a:p>
+          <a:p>
+            <a:pPr lvl="0"/>
+            <a:r>
+              <a:rPr/>
+              <a:t>Translate slow modules to C++</a:t>
+            </a:r>
+          </a:p>
+          <a:p>
+            <a:pPr lvl="0"/>
+            <a:r>
+              <a:rPr/>
+              <a:t>Impute missing covariates</a:t>
+            </a:r>
+          </a:p>
+          <a:p>
+            <a:pPr lvl="0"/>
+            <a:r>
+              <a:rPr/>
+              <a:t>Add longitudinal factors</a:t>
+            </a:r>
+          </a:p>
+          <a:p>
+            <a:pPr lvl="0"/>
+            <a:r>
+              <a:rPr/>
+              <a:t>Add random intercept effects</a:t>
+            </a:r>
+          </a:p>
+          <a:p>
+            <a:pPr lvl="0"/>
+            <a:r>
+              <a:rPr/>
+              <a:t>Simulation studies</a:t>
+            </a:r>
+          </a:p>
+          <a:p>
+            <a:pPr lvl="0"/>
+            <a:r>
+              <a:rPr/>
+              <a:t>Apply to ABCD Study in full</a:t>
+            </a:r>
+          </a:p>
+        </p:txBody>
+      </p:sp>
+    </p:spTree>
+  </p:cSld>
+</p:sld>
+</file>
+
+<file path=ppt/slides/slide12.xml><?xml version="1.0" encoding="utf-8"?>
+<p:sld xmlns:a="http://schemas.openxmlformats.org/drawingml/2006/main" xmlns:r="http://schemas.openxmlformats.org/officeDocument/2006/relationships" xmlns:p="http://schemas.openxmlformats.org/presentationml/2006/main">
+  <p:cSld>
+    <p:spTree>
+      <p:nvGrpSpPr>
+        <p:cNvPr id="1" name=""/>
+        <p:cNvGrpSpPr/>
+        <p:nvPr/>
+      </p:nvGrpSpPr>
+      <p:grpSpPr>
+        <a:xfrm>
+          <a:off x="0" y="0"/>
+          <a:ext cx="0" cy="0"/>
+          <a:chOff x="0" y="0"/>
+          <a:chExt cx="0" cy="0"/>
+        </a:xfrm>
+      </p:grpSpPr>
+      <p:sp>
+        <p:nvSpPr>
+          <p:cNvPr id="2" name="Title 1"/>
+          <p:cNvSpPr>
+            <a:spLocks noGrp="1"/>
+          </p:cNvSpPr>
+          <p:nvPr>
+            <p:ph type="title"/>
+          </p:nvPr>
+        </p:nvSpPr>
+        <p:spPr/>
+        <p:txBody>
+          <a:bodyPr/>
+          <a:lstStyle/>
+          <a:p>
+            <a:pPr lvl="0" indent="0" marL="0">
+              <a:buNone/>
+            </a:pPr>
+            <a:r>
+              <a:rPr/>
+              <a:t>Acknowledgements</a:t>
+            </a:r>
+          </a:p>
+        </p:txBody>
+      </p:sp>
+      <p:sp>
+        <p:nvSpPr>
+          <p:cNvPr id="3" name="Content Placeholder 2"/>
+          <p:cNvSpPr>
+            <a:spLocks noGrp="1"/>
+          </p:cNvSpPr>
+          <p:nvPr>
+            <p:ph idx="1"/>
+          </p:nvPr>
+        </p:nvSpPr>
+        <p:spPr/>
+        <p:txBody>
+          <a:bodyPr/>
+          <a:lstStyle/>
+          <a:p>
+            <a:pPr lvl="0"/>
+            <a:r>
+              <a:rPr/>
+              <a:t>Mark Fiecas, Thierry Chekouo, and Sandra Safo for their mentorship and expertise.</a:t>
+            </a:r>
+          </a:p>
+          <a:p>
+            <a:pPr lvl="0"/>
+            <a:r>
+              <a:rPr/>
+              <a:t>Saonli Basu, Tianzhong Yang, other faculty, fellow students, and family.</a:t>
+            </a:r>
+          </a:p>
+          <a:p>
+            <a:pPr lvl="0"/>
+            <a:r>
+              <a:rPr/>
+              <a:t>Interdisciplinary Biostatistics Training in Genetics and Genomics program, which is funded by NIH T32 Training Grant: T32 GM132063, 2020–2025</a:t>
+            </a:r>
+          </a:p>
+        </p:txBody>
+      </p:sp>
+    </p:spTree>
+  </p:cSld>
+</p:sld>
+</file>
+
+<file path=ppt/slides/slide2.xml><?xml version="1.0" encoding="utf-8"?>
+<p:sld xmlns:a="http://schemas.openxmlformats.org/drawingml/2006/main" xmlns:r="http://schemas.openxmlformats.org/officeDocument/2006/relationships" xmlns:p="http://schemas.openxmlformats.org/presentationml/2006/main">
+  <p:cSld>
+    <p:spTree>
+      <p:nvGrpSpPr>
+        <p:cNvPr id="1" name=""/>
+        <p:cNvGrpSpPr/>
+        <p:nvPr/>
+      </p:nvGrpSpPr>
+      <p:grpSpPr>
+        <a:xfrm>
+          <a:off x="0" y="0"/>
+          <a:ext cx="0" cy="0"/>
+          <a:chOff x="0" y="0"/>
+          <a:chExt cx="0" cy="0"/>
+        </a:xfrm>
+      </p:grpSpPr>
+      <p:sp>
+        <p:nvSpPr>
+          <p:cNvPr id="2" name="Title 1"/>
+          <p:cNvSpPr>
+            <a:spLocks noGrp="1"/>
+          </p:cNvSpPr>
+          <p:nvPr>
+            <p:ph type="title"/>
+          </p:nvPr>
+        </p:nvSpPr>
+        <p:spPr/>
+        <p:txBody>
+          <a:bodyPr/>
+          <a:lstStyle/>
+          <a:p>
+            <a:pPr lvl="0" indent="0" marL="0">
+              <a:buNone/>
+            </a:pPr>
+            <a:r>
+              <a:rPr/>
+              <a:t>Where are we going?</a:t>
+            </a:r>
+          </a:p>
+        </p:txBody>
+      </p:sp>
+      <p:sp>
+        <p:nvSpPr>
+          <p:cNvPr id="3" name="Content Placeholder 2"/>
+          <p:cNvSpPr>
+            <a:spLocks noGrp="1"/>
+          </p:cNvSpPr>
+          <p:nvPr>
+            <p:ph idx="1"/>
+          </p:nvPr>
+        </p:nvSpPr>
+        <p:spPr/>
+        <p:txBody>
+          <a:bodyPr/>
+          <a:lstStyle/>
+          <a:p>
+            <a:pPr lvl="0"/>
+            <a:r>
+              <a:rPr/>
+              <a:t>Research Introduction</a:t>
+            </a:r>
+          </a:p>
+          <a:p>
+            <a:pPr lvl="0"/>
+            <a:r>
+              <a:rPr/>
+              <a:t>Motivation</a:t>
+            </a:r>
+          </a:p>
+          <a:p>
+            <a:pPr lvl="0"/>
+            <a:r>
+              <a:rPr/>
+              <a:t>ABCD Study</a:t>
+            </a:r>
+          </a:p>
+          <a:p>
+            <a:pPr lvl="0"/>
+            <a:r>
+              <a:rPr/>
+              <a:t>Model Formulation</a:t>
+            </a:r>
+          </a:p>
+          <a:p>
+            <a:pPr lvl="0"/>
+            <a:r>
+              <a:rPr/>
+              <a:t>Ponderings/ Next Steps</a:t>
+            </a:r>
+          </a:p>
+        </p:txBody>
+      </p:sp>
+    </p:spTree>
+  </p:cSld>
+</p:sld>
+</file>
+
+<file path=ppt/slides/slide3.xml><?xml version="1.0" encoding="utf-8"?>
+<p:sld xmlns:a="http://schemas.openxmlformats.org/drawingml/2006/main" xmlns:r="http://schemas.openxmlformats.org/officeDocument/2006/relationships" xmlns:p="http://schemas.openxmlformats.org/presentationml/2006/main">
+  <p:cSld>
+    <p:spTree>
+      <p:nvGrpSpPr>
+        <p:cNvPr id="1" name=""/>
+        <p:cNvGrpSpPr/>
+        <p:nvPr/>
+      </p:nvGrpSpPr>
+      <p:grpSpPr>
+        <a:xfrm>
+          <a:off x="0" y="0"/>
+          <a:ext cx="0" cy="0"/>
+          <a:chOff x="0" y="0"/>
+          <a:chExt cx="0" cy="0"/>
+        </a:xfrm>
+      </p:grpSpPr>
+      <p:sp>
+        <p:nvSpPr>
+          <p:cNvPr id="2" name="Title 1"/>
+          <p:cNvSpPr>
+            <a:spLocks noGrp="1"/>
+          </p:cNvSpPr>
+          <p:nvPr>
+            <p:ph type="title"/>
+          </p:nvPr>
+        </p:nvSpPr>
+        <p:spPr/>
+        <p:txBody>
+          <a:bodyPr/>
+          <a:lstStyle/>
+          <a:p>
+            <a:pPr lvl="0" indent="0" marL="0">
+              <a:buNone/>
+            </a:pPr>
+            <a:r>
+              <a:rPr/>
+              <a:t>NSF GRFP?</a:t>
+            </a:r>
+          </a:p>
+        </p:txBody>
+      </p:sp>
+    </p:spTree>
+  </p:cSld>
+</p:sld>
+</file>
+
+<file path=ppt/slides/slide4.xml><?xml version="1.0" encoding="utf-8"?>
+<p:sld xmlns:a="http://schemas.openxmlformats.org/drawingml/2006/main" xmlns:r="http://schemas.openxmlformats.org/officeDocument/2006/relationships" xmlns:p="http://schemas.openxmlformats.org/presentationml/2006/main">
+  <p:cSld>
+    <p:spTree>
+      <p:nvGrpSpPr>
+        <p:cNvPr id="1" name=""/>
+        <p:cNvGrpSpPr/>
+        <p:nvPr/>
+      </p:nvGrpSpPr>
+      <p:grpSpPr>
+        <a:xfrm>
+          <a:off x="0" y="0"/>
+          <a:ext cx="0" cy="0"/>
+          <a:chOff x="0" y="0"/>
+          <a:chExt cx="0" cy="0"/>
+        </a:xfrm>
+      </p:grpSpPr>
+      <p:sp>
+        <p:nvSpPr>
+          <p:cNvPr id="2" name="Title 1"/>
+          <p:cNvSpPr>
+            <a:spLocks noGrp="1"/>
+          </p:cNvSpPr>
+          <p:nvPr>
+            <p:ph type="title"/>
+          </p:nvPr>
+        </p:nvSpPr>
+        <p:spPr/>
+        <p:txBody>
+          <a:bodyPr/>
+          <a:lstStyle/>
+          <a:p>
+            <a:pPr lvl="0" indent="0" marL="0">
+              <a:buNone/>
+            </a:pPr>
+            <a:r>
+              <a:rPr/>
+              <a:t>Intro: Bayesian Integrative Analysis and Prediction with Application to Atherosclerosis Cardiovascular Disease (Chekouo and Safo 2020)</a:t>
+            </a:r>
+          </a:p>
+        </p:txBody>
+      </p:sp>
+      <p:sp>
+        <p:nvSpPr>
+          <p:cNvPr id="3" name="Content Placeholder 2"/>
+          <p:cNvSpPr>
+            <a:spLocks noGrp="1"/>
+          </p:cNvSpPr>
+          <p:nvPr>
+            <p:ph idx="1"/>
+          </p:nvPr>
+        </p:nvSpPr>
+        <p:spPr/>
+        <p:txBody>
+          <a:bodyPr/>
+          <a:lstStyle/>
+          <a:p>
+            <a:pPr lvl="0"/>
+            <a:r>
+              <a:rPr/>
+              <a:t>Authors integrate clinical, demographic, and multi-omics data to ID genetic factors involved in artherosclerosis cardiovascular disease (ASCVD).</a:t>
+            </a:r>
+          </a:p>
+          <a:p>
+            <a:pPr lvl="0"/>
+            <a:r>
+              <a:rPr/>
+              <a:t>Frequentist joint integrative analysis and prediction methods exist e.g. Safo et al. 2019 combine CCA and linear discriminant analysis, “encourag[ing] predictors that are connected and behave similarly to be selected or neglected together”.</a:t>
+            </a:r>
+          </a:p>
+          <a:p>
+            <a:pPr lvl="0"/>
+            <a:r>
+              <a:rPr/>
+              <a:t>Authors leverage </a:t>
+            </a:r>
+            <a:r>
+              <a:rPr i="1"/>
+              <a:t>Bayesian</a:t>
+            </a:r>
+            <a:r>
+              <a:rPr/>
+              <a:t> hierarchical factor analysis models for </a:t>
+            </a:r>
+            <a:r>
+              <a:rPr i="1"/>
+              <a:t>variable selection</a:t>
+            </a:r>
+            <a:r>
+              <a:rPr/>
+              <a:t> and </a:t>
+            </a:r>
+            <a:r>
+              <a:rPr i="1"/>
+              <a:t>prediction</a:t>
+            </a:r>
+            <a:r>
+              <a:rPr/>
+              <a:t>.</a:t>
+            </a:r>
+          </a:p>
+        </p:txBody>
+      </p:sp>
+    </p:spTree>
+  </p:cSld>
+</p:sld>
+</file>
+
+<file path=ppt/slides/slide5.xml><?xml version="1.0" encoding="utf-8"?>
+<p:sld xmlns:a="http://schemas.openxmlformats.org/drawingml/2006/main" xmlns:r="http://schemas.openxmlformats.org/officeDocument/2006/relationships" xmlns:p="http://schemas.openxmlformats.org/presentationml/2006/main">
+  <p:cSld>
+    <p:spTree>
+      <p:nvGrpSpPr>
+        <p:cNvPr id="1" name=""/>
+        <p:cNvGrpSpPr/>
+        <p:nvPr/>
+      </p:nvGrpSpPr>
+      <p:grpSpPr>
+        <a:xfrm>
+          <a:off x="0" y="0"/>
+          <a:ext cx="0" cy="0"/>
+          <a:chOff x="0" y="0"/>
+          <a:chExt cx="0" cy="0"/>
+        </a:xfrm>
+      </p:grpSpPr>
+      <p:sp>
+        <p:nvSpPr>
+          <p:cNvPr id="2" name="Title 1"/>
+          <p:cNvSpPr>
+            <a:spLocks noGrp="1"/>
+          </p:cNvSpPr>
+          <p:nvPr>
+            <p:ph type="title"/>
+          </p:nvPr>
+        </p:nvSpPr>
+        <p:spPr/>
+        <p:txBody>
+          <a:bodyPr/>
+          <a:lstStyle/>
+          <a:p>
+            <a:pPr lvl="0" indent="0" marL="0">
+              <a:buNone/>
+            </a:pPr>
+            <a:r>
+              <a:rPr/>
+              <a:t>Motivation: Extension to Longitudinal Data Analysis</a:t>
+            </a:r>
+          </a:p>
+        </p:txBody>
+      </p:sp>
+      <p:sp>
+        <p:nvSpPr>
+          <p:cNvPr id="3" name="Content Placeholder 2"/>
+          <p:cNvSpPr>
+            <a:spLocks noGrp="1"/>
+          </p:cNvSpPr>
+          <p:nvPr>
+            <p:ph idx="1"/>
+          </p:nvPr>
+        </p:nvSpPr>
+        <p:spPr/>
+        <p:txBody>
+          <a:bodyPr/>
+          <a:lstStyle/>
+          <a:p>
+            <a:pPr lvl="0"/>
+            <a:r>
+              <a:rPr/>
+              <a:t>Adolescent Brain and Cognitive Development (ABCD) Study is an observational, longitudinal study of US children aged 9-10 at baseline across 21 study sites.</a:t>
+            </a:r>
+          </a:p>
+          <a:p>
+            <a:pPr lvl="0"/>
+            <a:r>
+              <a:rPr/>
+              <a:t>Neuroimaging data is collected every 2 years: baseline (T1) and year 2 (T2) neuroimaging data is available in 4th release.</a:t>
+            </a:r>
+          </a:p>
+          <a:p>
+            <a:pPr lvl="0"/>
+            <a:r>
+              <a:rPr/>
+              <a:t>Developmental trajectories have lifelong implications.</a:t>
+            </a:r>
+          </a:p>
+        </p:txBody>
+      </p:sp>
+    </p:spTree>
+  </p:cSld>
+</p:sld>
+</file>
+
+<file path=ppt/slides/slide6.xml><?xml version="1.0" encoding="utf-8"?>
+<p:sld xmlns:a="http://schemas.openxmlformats.org/drawingml/2006/main" xmlns:r="http://schemas.openxmlformats.org/officeDocument/2006/relationships" xmlns:p="http://schemas.openxmlformats.org/presentationml/2006/main">
+  <p:cSld>
+    <p:spTree>
+      <p:nvGrpSpPr>
+        <p:cNvPr id="1" name=""/>
+        <p:cNvGrpSpPr/>
+        <p:nvPr/>
+      </p:nvGrpSpPr>
+      <p:grpSpPr>
+        <a:xfrm>
+          <a:off x="0" y="0"/>
+          <a:ext cx="0" cy="0"/>
+          <a:chOff x="0" y="0"/>
+          <a:chExt cx="0" cy="0"/>
+        </a:xfrm>
+      </p:grpSpPr>
+      <p:sp>
+        <p:nvSpPr>
+          <p:cNvPr id="2" name="Title 1"/>
+          <p:cNvSpPr>
+            <a:spLocks noGrp="1"/>
+          </p:cNvSpPr>
+          <p:nvPr>
+            <p:ph type="title"/>
+          </p:nvPr>
+        </p:nvSpPr>
+        <p:spPr/>
+        <p:txBody>
+          <a:bodyPr/>
+          <a:lstStyle/>
+          <a:p>
+            <a:pPr lvl="0" indent="0" marL="0">
+              <a:buNone/>
+            </a:pPr>
+            <a:r>
+              <a:rPr/>
+              <a:t>ABCD Study: Sample Demographics</a:t>
+            </a:r>
+          </a:p>
+        </p:txBody>
+      </p:sp>
+      <p:sp>
+        <p:nvSpPr>
+          <p:cNvPr id="3" name="Content Placeholder 2"/>
+          <p:cNvSpPr>
+            <a:spLocks noGrp="1"/>
+          </p:cNvSpPr>
+          <p:nvPr>
+            <p:ph idx="1"/>
+          </p:nvPr>
+        </p:nvSpPr>
+        <p:spPr/>
+        <p:txBody>
+          <a:bodyPr/>
+          <a:lstStyle/>
+          <a:p>
+            <a:pPr lvl="0" indent="0" marL="0">
+              <a:buNone/>
+            </a:pPr>
+            <a:r>
+              <a:rPr/>
+              <a:t>We have selected subjects with neuroimaging data at T1 and T2.</a:t>
+            </a:r>
+          </a:p>
+        </p:txBody>
+      </p:sp>
+    </p:spTree>
+  </p:cSld>
+</p:sld>
+</file>
+
+<file path=ppt/slides/slide7.xml><?xml version="1.0" encoding="utf-8"?>
+<p:sld xmlns:a="http://schemas.openxmlformats.org/drawingml/2006/main" xmlns:r="http://schemas.openxmlformats.org/officeDocument/2006/relationships" xmlns:p="http://schemas.openxmlformats.org/presentationml/2006/main">
+  <p:cSld>
+    <p:spTree>
+      <p:nvGrpSpPr>
+        <p:cNvPr id="1" name=""/>
+        <p:cNvGrpSpPr/>
+        <p:nvPr/>
+      </p:nvGrpSpPr>
+      <p:grpSpPr>
+        <a:xfrm>
+          <a:off x="0" y="0"/>
+          <a:ext cx="0" cy="0"/>
+          <a:chOff x="0" y="0"/>
+          <a:chExt cx="0" cy="0"/>
+        </a:xfrm>
+      </p:grpSpPr>
+      <p:sp>
+        <p:nvSpPr>
+          <p:cNvPr id="2" name="Title 1"/>
+          <p:cNvSpPr>
+            <a:spLocks noGrp="1"/>
+          </p:cNvSpPr>
+          <p:nvPr>
+            <p:ph type="title"/>
+          </p:nvPr>
+        </p:nvSpPr>
+        <p:spPr/>
+        <p:txBody>
+          <a:bodyPr/>
+          <a:lstStyle/>
+          <a:p>
+            <a:pPr lvl="0" indent="0" marL="0">
+              <a:buNone/>
+            </a:pPr>
+            <a:r>
+              <a:rPr/>
+              <a:t>ABCD Study: Missingness</a:t>
+            </a:r>
+          </a:p>
+        </p:txBody>
+      </p:sp>
+      <p:sp>
+        <p:nvSpPr>
+          <p:cNvPr id="3" name="Content Placeholder 2"/>
+          <p:cNvSpPr>
+            <a:spLocks noGrp="1"/>
+          </p:cNvSpPr>
+          <p:nvPr>
+            <p:ph idx="1"/>
+          </p:nvPr>
+        </p:nvSpPr>
+        <p:spPr/>
+        <p:txBody>
+          <a:bodyPr/>
+          <a:lstStyle/>
+          <a:p>
+            <a:pPr lvl="0" indent="0" marL="0">
+              <a:buNone/>
+            </a:pPr>
+            <a:r>
+              <a:rPr/>
+              <a:t>We plan to impute subjects with missing covariates/ outcomes.</a:t>
+            </a:r>
+          </a:p>
+        </p:txBody>
+      </p:sp>
+    </p:spTree>
+  </p:cSld>
+</p:sld>
+</file>
+
+<file path=ppt/slides/slide8.xml><?xml version="1.0" encoding="utf-8"?>
+<p:sld xmlns:a="http://schemas.openxmlformats.org/drawingml/2006/main" xmlns:r="http://schemas.openxmlformats.org/officeDocument/2006/relationships" xmlns:p="http://schemas.openxmlformats.org/presentationml/2006/main">
+  <p:cSld>
+    <p:spTree>
+      <p:nvGrpSpPr>
+        <p:cNvPr id="1" name=""/>
+        <p:cNvGrpSpPr/>
+        <p:nvPr/>
+      </p:nvGrpSpPr>
+      <p:grpSpPr>
+        <a:xfrm>
+          <a:off x="0" y="0"/>
+          <a:ext cx="0" cy="0"/>
+          <a:chOff x="0" y="0"/>
+          <a:chExt cx="0" cy="0"/>
+        </a:xfrm>
+      </p:grpSpPr>
+      <p:sp>
+        <p:nvSpPr>
+          <p:cNvPr id="2" name="Title 1"/>
+          <p:cNvSpPr>
+            <a:spLocks noGrp="1"/>
+          </p:cNvSpPr>
+          <p:nvPr>
+            <p:ph type="title"/>
+          </p:nvPr>
+        </p:nvSpPr>
+        <p:spPr/>
+        <p:txBody>
+          <a:bodyPr/>
+          <a:lstStyle/>
+          <a:p>
+            <a:pPr lvl="0" indent="0" marL="0">
+              <a:buNone/>
+            </a:pPr>
+            <a:r>
+              <a:rPr/>
+              <a:t>ABCD Study: Clinical Outcome Trajectories</a:t>
+            </a:r>
+          </a:p>
+        </p:txBody>
+      </p:sp>
+      <p:sp>
+        <p:nvSpPr>
+          <p:cNvPr id="3" name="Content Placeholder 2"/>
+          <p:cNvSpPr>
+            <a:spLocks noGrp="1"/>
+          </p:cNvSpPr>
+          <p:nvPr>
+            <p:ph idx="1"/>
+          </p:nvPr>
+        </p:nvSpPr>
+        <p:spPr/>
+        <p:txBody>
+          <a:bodyPr/>
+          <a:lstStyle/>
+          <a:p>
+            <a:pPr lvl="0" indent="0" marL="0">
+              <a:buNone/>
+            </a:pPr>
+            <a:r>
+              <a:rPr/>
+              <a:t>We are considering inclusion of a random intercept.</a:t>
+            </a:r>
+          </a:p>
+        </p:txBody>
+      </p:sp>
+    </p:spTree>
+  </p:cSld>
+</p:sld>
+</file>
+
+<file path=ppt/slides/slide9.xml><?xml version="1.0" encoding="utf-8"?>
+<p:sld xmlns:a="http://schemas.openxmlformats.org/drawingml/2006/main" xmlns:r="http://schemas.openxmlformats.org/officeDocument/2006/relationships" xmlns:p="http://schemas.openxmlformats.org/presentationml/2006/main">
+  <p:cSld>
+    <p:spTree>
+      <p:nvGrpSpPr>
+        <p:cNvPr id="1" name=""/>
+        <p:cNvGrpSpPr/>
+        <p:nvPr/>
+      </p:nvGrpSpPr>
+      <p:grpSpPr>
+        <a:xfrm>
+          <a:off x="0" y="0"/>
+          <a:ext cx="0" cy="0"/>
+          <a:chOff x="0" y="0"/>
+          <a:chExt cx="0" cy="0"/>
+        </a:xfrm>
+      </p:grpSpPr>
+      <p:sp>
+        <p:nvSpPr>
+          <p:cNvPr id="2" name="Title 1"/>
+          <p:cNvSpPr>
+            <a:spLocks noGrp="1"/>
+          </p:cNvSpPr>
+          <p:nvPr>
+            <p:ph type="title"/>
+          </p:nvPr>
+        </p:nvSpPr>
+        <p:spPr/>
+        <p:txBody>
+          <a:bodyPr/>
+          <a:lstStyle/>
+          <a:p>
+            <a:pPr lvl="0" indent="0" marL="0">
+              <a:buNone/>
+            </a:pPr>
+            <a:r>
+              <a:rPr/>
+              <a:t>Model Formulation: Integrating Multiple Data Types</a:t>
+            </a:r>
+          </a:p>
+        </p:txBody>
+      </p:sp>
+      <mc:AlternateContent xmlns:mc="http://schemas.openxmlformats.org/markup-compatibility/2006">
+        <mc:Choice xmlns:a14="http://schemas.microsoft.com/office/drawing/2010/main" Requires="a14">
+          <p:sp>
+            <p:nvSpPr>
+              <p:cNvPr id="3" name="Content Placeholder 2"/>
+              <p:cNvSpPr>
+                <a:spLocks noGrp="1"/>
+              </p:cNvSpPr>
+              <p:nvPr>
+                <p:ph idx="1"/>
+              </p:nvPr>
+            </p:nvSpPr>
+            <p:spPr/>
+            <p:txBody>
+              <a:bodyPr/>
+              <a:lstStyle/>
+              <a:p>
+                <a:pPr lvl="0"/>
+                <a:r>
+                  <a:rPr/>
+                  <a:t>Indices: </a:t>
+                </a:r>
+                <a14:m>
+                  <m:oMath xmlns:m="http://schemas.openxmlformats.org/officeDocument/2006/math">
+                    <m:r>
+                      <m:t>j</m:t>
+                    </m:r>
+                  </m:oMath>
+                </a14:m>
+                <a:r>
+                  <a:rPr/>
+                  <a:t> feature, </a:t>
+                </a:r>
+                <a14:m>
+                  <m:oMath xmlns:m="http://schemas.openxmlformats.org/officeDocument/2006/math">
+                    <m:r>
+                      <m:t>t</m:t>
+                    </m:r>
+                  </m:oMath>
+                </a14:m>
+                <a:r>
+                  <a:rPr/>
+                  <a:t> time 1,2, </a:t>
+                </a:r>
+                <a14:m>
+                  <m:oMath xmlns:m="http://schemas.openxmlformats.org/officeDocument/2006/math">
+                    <m:r>
+                      <m:t>l</m:t>
+                    </m:r>
+                  </m:oMath>
+                </a14:m>
+                <a:r>
+                  <a:rPr/>
+                  <a:t> component, </a:t>
+                </a:r>
+                <a14:m>
+                  <m:oMath xmlns:m="http://schemas.openxmlformats.org/officeDocument/2006/math">
+                    <m:r>
+                      <m:t>i</m:t>
+                    </m:r>
+                  </m:oMath>
+                </a14:m>
+                <a:r>
+                  <a:rPr/>
+                  <a:t> subject in </a:t>
+                </a:r>
+                <a14:m>
+                  <m:oMath xmlns:m="http://schemas.openxmlformats.org/officeDocument/2006/math">
+                    <m:r>
+                      <m:t>c</m:t>
+                    </m:r>
+                  </m:oMath>
+                </a14:m>
+                <a:r>
+                  <a:rPr/>
+                  <a:t> family in </a:t>
+                </a:r>
+                <a14:m>
+                  <m:oMath xmlns:m="http://schemas.openxmlformats.org/officeDocument/2006/math">
+                    <m:r>
+                      <m:t>d</m:t>
+                    </m:r>
+                  </m:oMath>
+                </a14:m>
+                <a:r>
+                  <a:rPr/>
+                  <a:t> site (highest level)</a:t>
                 </a:r>
               </a:p>
               <a:p>
@@ -4382,875 +5422,6 @@
           </p:sp>
         </mc:Choice>
       </mc:AlternateContent>
-    </p:spTree>
-  </p:cSld>
-</p:sld>
-</file>
-
-<file path=ppt/slides/slide8.xml><?xml version="1.0" encoding="utf-8"?>
-<p:sld xmlns:a="http://schemas.openxmlformats.org/drawingml/2006/main" xmlns:r="http://schemas.openxmlformats.org/officeDocument/2006/relationships" xmlns:p="http://schemas.openxmlformats.org/presentationml/2006/main">
-  <p:cSld>
-    <p:spTree>
-      <p:nvGrpSpPr>
-        <p:cNvPr id="1" name=""/>
-        <p:cNvGrpSpPr/>
-        <p:nvPr/>
-      </p:nvGrpSpPr>
-      <p:grpSpPr>
-        <a:xfrm>
-          <a:off x="0" y="0"/>
-          <a:ext cx="0" cy="0"/>
-          <a:chOff x="0" y="0"/>
-          <a:chExt cx="0" cy="0"/>
-        </a:xfrm>
-      </p:grpSpPr>
-      <p:sp>
-        <p:nvSpPr>
-          <p:cNvPr id="2" name="Title 1"/>
-          <p:cNvSpPr>
-            <a:spLocks noGrp="1"/>
-          </p:cNvSpPr>
-          <p:nvPr>
-            <p:ph type="title"/>
-          </p:nvPr>
-        </p:nvSpPr>
-        <p:spPr/>
-        <p:txBody>
-          <a:bodyPr/>
-          <a:lstStyle/>
-          <a:p>
-            <a:pPr lvl="0" indent="0" marL="0">
-              <a:buNone/>
-            </a:pPr>
-            <a:r>
-              <a:rPr/>
-              <a:t>Model Formulation: Incorporating Longitudinal and Mixed Effects</a:t>
-            </a:r>
-          </a:p>
-        </p:txBody>
-      </p:sp>
-      <mc:AlternateContent xmlns:mc="http://schemas.openxmlformats.org/markup-compatibility/2006">
-        <mc:Choice xmlns:a14="http://schemas.microsoft.com/office/drawing/2010/main" Requires="a14">
-          <p:sp>
-            <p:nvSpPr>
-              <p:cNvPr id="3" name="Content Placeholder 2"/>
-              <p:cNvSpPr>
-                <a:spLocks noGrp="1"/>
-              </p:cNvSpPr>
-              <p:nvPr>
-                <p:ph idx="1"/>
-              </p:nvPr>
-            </p:nvSpPr>
-            <p:spPr/>
-            <p:txBody>
-              <a:bodyPr/>
-              <a:lstStyle/>
-              <a:p>
-                <a:pPr lvl="0"/>
-                <a:r>
-                  <a:rPr/>
-                  <a:t>Indices: </a:t>
-                </a:r>
-                <a14:m>
-                  <m:oMath xmlns:m="http://schemas.openxmlformats.org/officeDocument/2006/math">
-                    <m:r>
-                      <m:t>i</m:t>
-                    </m:r>
-                  </m:oMath>
-                </a14:m>
-                <a:r>
-                  <a:rPr/>
-                  <a:t> subject, </a:t>
-                </a:r>
-                <a14:m>
-                  <m:oMath xmlns:m="http://schemas.openxmlformats.org/officeDocument/2006/math">
-                    <m:r>
-                      <m:t>j</m:t>
-                    </m:r>
-                  </m:oMath>
-                </a14:m>
-                <a:r>
-                  <a:rPr/>
-                  <a:t> feature, </a:t>
-                </a:r>
-                <a14:m>
-                  <m:oMath xmlns:m="http://schemas.openxmlformats.org/officeDocument/2006/math">
-                    <m:r>
-                      <m:t>t</m:t>
-                    </m:r>
-                  </m:oMath>
-                </a14:m>
-                <a:r>
-                  <a:rPr/>
-                  <a:t> time 1,2, </a:t>
-                </a:r>
-                <a14:m>
-                  <m:oMath xmlns:m="http://schemas.openxmlformats.org/officeDocument/2006/math">
-                    <m:r>
-                      <m:t>l</m:t>
-                    </m:r>
-                  </m:oMath>
-                </a14:m>
-                <a:r>
-                  <a:rPr/>
-                  <a:t> component, </a:t>
-                </a:r>
-                <a14:m>
-                  <m:oMath xmlns:m="http://schemas.openxmlformats.org/officeDocument/2006/math">
-                    <m:r>
-                      <m:t>c</m:t>
-                    </m:r>
-                  </m:oMath>
-                </a14:m>
-                <a:r>
-                  <a:rPr/>
-                  <a:t> site, </a:t>
-                </a:r>
-                <a14:m>
-                  <m:oMath xmlns:m="http://schemas.openxmlformats.org/officeDocument/2006/math">
-                    <m:r>
-                      <m:t>d</m:t>
-                    </m:r>
-                  </m:oMath>
-                </a14:m>
-                <a:r>
-                  <a:rPr/>
-                  <a:t> family.</a:t>
-                </a:r>
-              </a:p>
-              <a:p>
-                <a:pPr lvl="0"/>
-                <a:r>
-                  <a:rPr/>
-                  <a:t>Response: </a:t>
-                </a:r>
-                <a14:m>
-                  <m:oMath xmlns:m="http://schemas.openxmlformats.org/officeDocument/2006/math">
-                    <m:sSub>
-                      <m:e>
-                        <m:r>
-                          <m:t>Y</m:t>
-                        </m:r>
-                      </m:e>
-                      <m:sub>
-                        <m:r>
-                          <m:t>i</m:t>
-                        </m:r>
-                        <m:r>
-                          <m:t>t</m:t>
-                        </m:r>
-                      </m:sub>
-                    </m:sSub>
-                    <m:r>
-                      <m:rPr>
-                        <m:sty m:val="p"/>
-                      </m:rPr>
-                      <m:t>=</m:t>
-                    </m:r>
-                    <m:sSubSup>
-                      <m:e>
-                        <m:r>
-                          <m:t>Σ</m:t>
-                        </m:r>
-                      </m:e>
-                      <m:sub>
-                        <m:r>
-                          <m:t>l</m:t>
-                        </m:r>
-                        <m:r>
-                          <m:rPr>
-                            <m:sty m:val="p"/>
-                          </m:rPr>
-                          <m:t>=</m:t>
-                        </m:r>
-                        <m:r>
-                          <m:t>1</m:t>
-                        </m:r>
-                      </m:sub>
-                      <m:sup>
-                        <m:r>
-                          <m:t>r</m:t>
-                        </m:r>
-                      </m:sup>
-                    </m:sSubSup>
-                    <m:sSub>
-                      <m:e>
-                        <m:r>
-                          <m:t>U</m:t>
-                        </m:r>
-                      </m:e>
-                      <m:sub>
-                        <m:r>
-                          <m:t>i</m:t>
-                        </m:r>
-                        <m:r>
-                          <m:t>l</m:t>
-                        </m:r>
-                        <m:r>
-                          <m:t>t</m:t>
-                        </m:r>
-                      </m:sub>
-                    </m:sSub>
-                    <m:sSub>
-                      <m:e>
-                        <m:r>
-                          <m:t>β</m:t>
-                        </m:r>
-                      </m:e>
-                      <m:sub>
-                        <m:r>
-                          <m:t>l</m:t>
-                        </m:r>
-                        <m:r>
-                          <m:t>j</m:t>
-                        </m:r>
-                      </m:sub>
-                    </m:sSub>
-                    <m:r>
-                      <m:rPr>
-                        <m:sty m:val="p"/>
-                      </m:rPr>
-                      <m:t>+</m:t>
-                    </m:r>
-                    <m:r>
-                      <m:t>α</m:t>
-                    </m:r>
-                    <m:r>
-                      <m:t>t</m:t>
-                    </m:r>
-                    <m:r>
-                      <m:rPr>
-                        <m:sty m:val="p"/>
-                      </m:rPr>
-                      <m:t>+</m:t>
-                    </m:r>
-                    <m:sSub>
-                      <m:e>
-                        <m:r>
-                          <m:t>Z</m:t>
-                        </m:r>
-                      </m:e>
-                      <m:sub>
-                        <m:r>
-                          <m:t>i</m:t>
-                        </m:r>
-                      </m:sub>
-                    </m:sSub>
-                    <m:sSub>
-                      <m:e>
-                        <m:r>
-                          <m:t>γ</m:t>
-                        </m:r>
-                      </m:e>
-                      <m:sub>
-                        <m:r>
-                          <m:t>i</m:t>
-                        </m:r>
-                      </m:sub>
-                    </m:sSub>
-                    <m:r>
-                      <m:rPr>
-                        <m:sty m:val="p"/>
-                      </m:rPr>
-                      <m:t>+</m:t>
-                    </m:r>
-                    <m:sSub>
-                      <m:e>
-                        <m:r>
-                          <m:t>β</m:t>
-                        </m:r>
-                      </m:e>
-                      <m:sub>
-                        <m:r>
-                          <m:t>0</m:t>
-                        </m:r>
-                        <m:r>
-                          <m:t>c</m:t>
-                        </m:r>
-                        <m:r>
-                          <m:t>d</m:t>
-                        </m:r>
-                      </m:sub>
-                    </m:sSub>
-                    <m:r>
-                      <m:rPr>
-                        <m:sty m:val="p"/>
-                      </m:rPr>
-                      <m:t>+</m:t>
-                    </m:r>
-                    <m:sSub>
-                      <m:e>
-                        <m:r>
-                          <m:t>R</m:t>
-                        </m:r>
-                      </m:e>
-                      <m:sub>
-                        <m:r>
-                          <m:t>i</m:t>
-                        </m:r>
-                        <m:r>
-                          <m:t>c</m:t>
-                        </m:r>
-                        <m:r>
-                          <m:t>d</m:t>
-                        </m:r>
-                      </m:sub>
-                    </m:sSub>
-                    <m:r>
-                      <m:rPr>
-                        <m:sty m:val="p"/>
-                      </m:rPr>
-                      <m:t>+</m:t>
-                    </m:r>
-                    <m:sSub>
-                      <m:e>
-                        <m:r>
-                          <m:t>ϵ</m:t>
-                        </m:r>
-                      </m:e>
-                      <m:sub>
-                        <m:r>
-                          <m:t>i</m:t>
-                        </m:r>
-                        <m:r>
-                          <m:t>t</m:t>
-                        </m:r>
-                      </m:sub>
-                    </m:sSub>
-                  </m:oMath>
-                </a14:m>
-                <a:r>
-                  <a:rPr/>
-                  <a:t> where </a:t>
-                </a:r>
-                <a14:m>
-                  <m:oMath xmlns:m="http://schemas.openxmlformats.org/officeDocument/2006/math">
-                    <m:r>
-                      <m:t>α</m:t>
-                    </m:r>
-                  </m:oMath>
-                </a14:m>
-                <a:r>
-                  <a:rPr/>
-                  <a:t> fixed temporal effect, </a:t>
-                </a:r>
-                <a14:m>
-                  <m:oMath xmlns:m="http://schemas.openxmlformats.org/officeDocument/2006/math">
-                    <m:r>
-                      <m:t>Z</m:t>
-                    </m:r>
-                    <m:r>
-                      <m:t>γ</m:t>
-                    </m:r>
-                  </m:oMath>
-                </a14:m>
-                <a:r>
-                  <a:rPr/>
-                  <a:t> covariates, </a:t>
-                </a:r>
-                <a14:m>
-                  <m:oMath xmlns:m="http://schemas.openxmlformats.org/officeDocument/2006/math">
-                    <m:sSub>
-                      <m:e>
-                        <m:r>
-                          <m:t>ϵ</m:t>
-                        </m:r>
-                      </m:e>
-                      <m:sub>
-                        <m:r>
-                          <m:t>i</m:t>
-                        </m:r>
-                        <m:r>
-                          <m:t>t</m:t>
-                        </m:r>
-                      </m:sub>
-                    </m:sSub>
-                    <m:limUpp>
-                      <m:e>
-                        <m:r>
-                          <m:rPr>
-                            <m:sty m:val="p"/>
-                          </m:rPr>
-                          <m:t>∼</m:t>
-                        </m:r>
-                      </m:e>
-                      <m:lim>
-                        <m:r>
-                          <m:rPr>
-                            <m:sty m:val="p"/>
-                          </m:rPr>
-                          <m:t>i</m:t>
-                        </m:r>
-                        <m:r>
-                          <m:rPr>
-                            <m:sty m:val="p"/>
-                          </m:rPr>
-                          <m:t>i</m:t>
-                        </m:r>
-                        <m:r>
-                          <m:rPr>
-                            <m:sty m:val="p"/>
-                          </m:rPr>
-                          <m:t>d</m:t>
-                        </m:r>
-                      </m:lim>
-                    </m:limUpp>
-                    <m:r>
-                      <m:t>N</m:t>
-                    </m:r>
-                    <m:d>
-                      <m:dPr>
-                        <m:begChr m:val="("/>
-                        <m:endChr m:val=")"/>
-                        <m:sepChr m:val=""/>
-                        <m:grow/>
-                      </m:dPr>
-                      <m:e>
-                        <m:r>
-                          <m:t>0</m:t>
-                        </m:r>
-                        <m:r>
-                          <m:rPr>
-                            <m:sty m:val="p"/>
-                          </m:rPr>
-                          <m:t>,</m:t>
-                        </m:r>
-                        <m:sSubSup>
-                          <m:e>
-                            <m:r>
-                              <m:t>σ</m:t>
-                            </m:r>
-                          </m:e>
-                          <m:sub>
-                            <m:r>
-                              <m:t>i</m:t>
-                            </m:r>
-                            <m:r>
-                              <m:t>t</m:t>
-                            </m:r>
-                          </m:sub>
-                          <m:sup>
-                            <m:r>
-                              <m:t>2</m:t>
-                            </m:r>
-                          </m:sup>
-                        </m:sSubSup>
-                      </m:e>
-                    </m:d>
-                  </m:oMath>
-                </a14:m>
-                <a:r>
-                  <a:rPr/>
-                  <a:t>$</a:t>
-                </a:r>
-              </a:p>
-              <a:p>
-                <a:pPr lvl="0"/>
-                <a:r>
-                  <a:rPr/>
-                  <a:t>Level 2 Intercept: </a:t>
-                </a:r>
-                <a14:m>
-                  <m:oMath xmlns:m="http://schemas.openxmlformats.org/officeDocument/2006/math">
-                    <m:sSub>
-                      <m:e>
-                        <m:r>
-                          <m:t>β</m:t>
-                        </m:r>
-                      </m:e>
-                      <m:sub>
-                        <m:r>
-                          <m:t>0</m:t>
-                        </m:r>
-                        <m:r>
-                          <m:t>c</m:t>
-                        </m:r>
-                        <m:r>
-                          <m:t>d</m:t>
-                        </m:r>
-                      </m:sub>
-                    </m:sSub>
-                    <m:r>
-                      <m:rPr>
-                        <m:sty m:val="p"/>
-                      </m:rPr>
-                      <m:t>=</m:t>
-                    </m:r>
-                    <m:sSub>
-                      <m:e>
-                        <m:r>
-                          <m:t>δ</m:t>
-                        </m:r>
-                      </m:e>
-                      <m:sub>
-                        <m:r>
-                          <m:t>00</m:t>
-                        </m:r>
-                        <m:r>
-                          <m:t>c</m:t>
-                        </m:r>
-                      </m:sub>
-                    </m:sSub>
-                    <m:r>
-                      <m:rPr>
-                        <m:sty m:val="p"/>
-                      </m:rPr>
-                      <m:t>+</m:t>
-                    </m:r>
-                    <m:sSub>
-                      <m:e>
-                        <m:r>
-                          <m:t>L</m:t>
-                        </m:r>
-                      </m:e>
-                      <m:sub>
-                        <m:r>
-                          <m:t>0</m:t>
-                        </m:r>
-                        <m:r>
-                          <m:t>c</m:t>
-                        </m:r>
-                        <m:r>
-                          <m:t>d</m:t>
-                        </m:r>
-                      </m:sub>
-                    </m:sSub>
-                  </m:oMath>
-                </a14:m>
-              </a:p>
-              <a:p>
-                <a:pPr lvl="0"/>
-                <a:r>
-                  <a:rPr/>
-                  <a:t>Level 3 Intercept: </a:t>
-                </a:r>
-                <a14:m>
-                  <m:oMath xmlns:m="http://schemas.openxmlformats.org/officeDocument/2006/math">
-                    <m:sSub>
-                      <m:e>
-                        <m:r>
-                          <m:t>δ</m:t>
-                        </m:r>
-                      </m:e>
-                      <m:sub>
-                        <m:r>
-                          <m:t>00</m:t>
-                        </m:r>
-                        <m:r>
-                          <m:t>c</m:t>
-                        </m:r>
-                      </m:sub>
-                    </m:sSub>
-                    <m:r>
-                      <m:rPr>
-                        <m:sty m:val="p"/>
-                      </m:rPr>
-                      <m:t>=</m:t>
-                    </m:r>
-                    <m:sSub>
-                      <m:e>
-                        <m:r>
-                          <m:t>λ</m:t>
-                        </m:r>
-                      </m:e>
-                      <m:sub>
-                        <m:r>
-                          <m:t>000</m:t>
-                        </m:r>
-                      </m:sub>
-                    </m:sSub>
-                    <m:r>
-                      <m:rPr>
-                        <m:sty m:val="p"/>
-                      </m:rPr>
-                      <m:t>+</m:t>
-                    </m:r>
-                    <m:sSub>
-                      <m:e>
-                        <m:r>
-                          <m:t>G</m:t>
-                        </m:r>
-                      </m:e>
-                      <m:sub>
-                        <m:r>
-                          <m:t>00</m:t>
-                        </m:r>
-                        <m:r>
-                          <m:t>d</m:t>
-                        </m:r>
-                      </m:sub>
-                    </m:sSub>
-                  </m:oMath>
-                </a14:m>
-              </a:p>
-              <a:p>
-                <a:pPr lvl="0"/>
-                <a14:m>
-                  <m:oMath xmlns:m="http://schemas.openxmlformats.org/officeDocument/2006/math">
-                    <m:r>
-                      <m:t>R</m:t>
-                    </m:r>
-                    <m:r>
-                      <m:rPr>
-                        <m:sty m:val="p"/>
-                      </m:rPr>
-                      <m:t>∼</m:t>
-                    </m:r>
-                    <m:r>
-                      <m:t>N</m:t>
-                    </m:r>
-                    <m:d>
-                      <m:dPr>
-                        <m:begChr m:val="("/>
-                        <m:endChr m:val=")"/>
-                        <m:sepChr m:val=""/>
-                        <m:grow/>
-                      </m:dPr>
-                      <m:e>
-                        <m:r>
-                          <m:t>0</m:t>
-                        </m:r>
-                        <m:r>
-                          <m:rPr>
-                            <m:sty m:val="p"/>
-                          </m:rPr>
-                          <m:t>,</m:t>
-                        </m:r>
-                        <m:sSup>
-                          <m:e>
-                            <m:r>
-                              <m:t>σ</m:t>
-                            </m:r>
-                          </m:e>
-                          <m:sup>
-                            <m:r>
-                              <m:t>2</m:t>
-                            </m:r>
-                          </m:sup>
-                        </m:sSup>
-                      </m:e>
-                    </m:d>
-                  </m:oMath>
-                </a14:m>
-                <a:r>
-                  <a:rPr/>
-                  <a:t>, </a:t>
-                </a:r>
-                <a14:m>
-                  <m:oMath xmlns:m="http://schemas.openxmlformats.org/officeDocument/2006/math">
-                    <m:r>
-                      <m:t>L</m:t>
-                    </m:r>
-                    <m:r>
-                      <m:rPr>
-                        <m:sty m:val="p"/>
-                      </m:rPr>
-                      <m:t>∼</m:t>
-                    </m:r>
-                    <m:r>
-                      <m:t>N</m:t>
-                    </m:r>
-                    <m:d>
-                      <m:dPr>
-                        <m:begChr m:val="("/>
-                        <m:endChr m:val=")"/>
-                        <m:sepChr m:val=""/>
-                        <m:grow/>
-                      </m:dPr>
-                      <m:e>
-                        <m:r>
-                          <m:t>0</m:t>
-                        </m:r>
-                        <m:r>
-                          <m:rPr>
-                            <m:sty m:val="p"/>
-                          </m:rPr>
-                          <m:t>,</m:t>
-                        </m:r>
-                        <m:sSup>
-                          <m:e>
-                            <m:r>
-                              <m:t>τ</m:t>
-                            </m:r>
-                          </m:e>
-                          <m:sup>
-                            <m:r>
-                              <m:t>2</m:t>
-                            </m:r>
-                          </m:sup>
-                        </m:sSup>
-                      </m:e>
-                    </m:d>
-                  </m:oMath>
-                </a14:m>
-                <a:r>
-                  <a:rPr/>
-                  <a:t>, </a:t>
-                </a:r>
-                <a14:m>
-                  <m:oMath xmlns:m="http://schemas.openxmlformats.org/officeDocument/2006/math">
-                    <m:r>
-                      <m:t>G</m:t>
-                    </m:r>
-                    <m:r>
-                      <m:rPr>
-                        <m:sty m:val="p"/>
-                      </m:rPr>
-                      <m:t>∼</m:t>
-                    </m:r>
-                    <m:r>
-                      <m:t>N</m:t>
-                    </m:r>
-                    <m:d>
-                      <m:dPr>
-                        <m:begChr m:val="("/>
-                        <m:endChr m:val=")"/>
-                        <m:sepChr m:val=""/>
-                        <m:grow/>
-                      </m:dPr>
-                      <m:e>
-                        <m:r>
-                          <m:t>0</m:t>
-                        </m:r>
-                        <m:r>
-                          <m:rPr>
-                            <m:sty m:val="p"/>
-                          </m:rPr>
-                          <m:t>,</m:t>
-                        </m:r>
-                        <m:sSup>
-                          <m:e>
-                            <m:r>
-                              <m:t>ν</m:t>
-                            </m:r>
-                          </m:e>
-                          <m:sup>
-                            <m:r>
-                              <m:t>2</m:t>
-                            </m:r>
-                          </m:sup>
-                        </m:sSup>
-                      </m:e>
-                    </m:d>
-                  </m:oMath>
-                </a14:m>
-              </a:p>
-            </p:txBody>
-          </p:sp>
-        </mc:Choice>
-      </mc:AlternateContent>
-    </p:spTree>
-  </p:cSld>
-</p:sld>
-</file>
-
-<file path=ppt/slides/slide9.xml><?xml version="1.0" encoding="utf-8"?>
-<p:sld xmlns:a="http://schemas.openxmlformats.org/drawingml/2006/main" xmlns:r="http://schemas.openxmlformats.org/officeDocument/2006/relationships" xmlns:p="http://schemas.openxmlformats.org/presentationml/2006/main">
-  <p:cSld>
-    <p:spTree>
-      <p:nvGrpSpPr>
-        <p:cNvPr id="1" name=""/>
-        <p:cNvGrpSpPr/>
-        <p:nvPr/>
-      </p:nvGrpSpPr>
-      <p:grpSpPr>
-        <a:xfrm>
-          <a:off x="0" y="0"/>
-          <a:ext cx="0" cy="0"/>
-          <a:chOff x="0" y="0"/>
-          <a:chExt cx="0" cy="0"/>
-        </a:xfrm>
-      </p:grpSpPr>
-      <p:sp>
-        <p:nvSpPr>
-          <p:cNvPr id="2" name="Title 1"/>
-          <p:cNvSpPr>
-            <a:spLocks noGrp="1"/>
-          </p:cNvSpPr>
-          <p:nvPr>
-            <p:ph type="title"/>
-          </p:nvPr>
-        </p:nvSpPr>
-        <p:spPr/>
-        <p:txBody>
-          <a:bodyPr/>
-          <a:lstStyle/>
-          <a:p>
-            <a:pPr lvl="0" indent="0" marL="0">
-              <a:buNone/>
-            </a:pPr>
-            <a:r>
-              <a:rPr/>
-              <a:t>Proposed Next Steps</a:t>
-            </a:r>
-          </a:p>
-        </p:txBody>
-      </p:sp>
-      <p:sp>
-        <p:nvSpPr>
-          <p:cNvPr id="3" name="Content Placeholder 2"/>
-          <p:cNvSpPr>
-            <a:spLocks noGrp="1"/>
-          </p:cNvSpPr>
-          <p:nvPr>
-            <p:ph idx="1"/>
-          </p:nvPr>
-        </p:nvSpPr>
-        <p:spPr/>
-        <p:txBody>
-          <a:bodyPr/>
-          <a:lstStyle/>
-          <a:p>
-            <a:pPr lvl="0"/>
-            <a:r>
-              <a:rPr/>
-              <a:t>Implement cross-sectional model in R</a:t>
-            </a:r>
-          </a:p>
-          <a:p>
-            <a:pPr lvl="0"/>
-            <a:r>
-              <a:rPr/>
-              <a:t>Translate slow modules to C++</a:t>
-            </a:r>
-          </a:p>
-          <a:p>
-            <a:pPr lvl="0"/>
-            <a:r>
-              <a:rPr/>
-              <a:t>Impute missing covariates</a:t>
-            </a:r>
-          </a:p>
-          <a:p>
-            <a:pPr lvl="0"/>
-            <a:r>
-              <a:rPr/>
-              <a:t>Add longitudinal factors</a:t>
-            </a:r>
-          </a:p>
-          <a:p>
-            <a:pPr lvl="0"/>
-            <a:r>
-              <a:rPr/>
-              <a:t>Add random intercept effects</a:t>
-            </a:r>
-          </a:p>
-          <a:p>
-            <a:pPr lvl="0"/>
-            <a:r>
-              <a:rPr/>
-              <a:t>Simulation studies</a:t>
-            </a:r>
-          </a:p>
-          <a:p>
-            <a:pPr lvl="0"/>
-            <a:r>
-              <a:rPr/>
-              <a:t>Apply to ABCD Study in full</a:t>
-            </a:r>
-          </a:p>
-        </p:txBody>
-      </p:sp>
     </p:spTree>
   </p:cSld>
 </p:sld>

</xml_diff>